<commit_message>
Modify abstract for submission version
</commit_message>
<xml_diff>
--- a/figure/BarGraph_ndt_matching.pptx
+++ b/figure/BarGraph_ndt_matching.pptx
@@ -184,10 +184,10 @@
                 <c:formatCode>#,##0.0000_ </c:formatCode>
                 <c:ptCount val="2"/>
                 <c:pt idx="0">
-                  <c:v>0.29799999999999999</c:v>
+                  <c:v>298</c:v>
                 </c:pt>
                 <c:pt idx="1">
-                  <c:v>7.8E-2</c:v>
+                  <c:v>78</c:v>
                 </c:pt>
               </c:numCache>
             </c:numRef>
@@ -245,10 +245,10 @@
                 <c:formatCode>#,##0.0000_ </c:formatCode>
                 <c:ptCount val="2"/>
                 <c:pt idx="0">
-                  <c:v>6.0000000000000053E-3</c:v>
+                  <c:v>6</c:v>
                 </c:pt>
                 <c:pt idx="1">
-                  <c:v>4.0000000000000036E-3</c:v>
+                  <c:v>4</c:v>
                 </c:pt>
               </c:numCache>
             </c:numRef>
@@ -337,10 +337,10 @@
                       <c:formatCode>#,##0.0000_ </c:formatCode>
                       <c:ptCount val="2"/>
                       <c:pt idx="0">
-                        <c:v>3.5061666666666671</c:v>
+                        <c:v>3506.166666666667</c:v>
                       </c:pt>
                       <c:pt idx="1">
-                        <c:v>1.7576000000000001</c:v>
+                        <c:v>1757.6000000000001</c:v>
                       </c:pt>
                     </c:numCache>
                   </c:numRef>
@@ -444,16 +444,46 @@
                   </a:defRPr>
                 </a:pPr>
                 <a:r>
-                  <a:rPr lang="en-US" altLang="ja-JP" sz="1600">
+                  <a:rPr lang="en-US" altLang="ja-JP" sz="1600" dirty="0">
                     <a:solidFill>
                       <a:sysClr val="windowText" lastClr="000000"/>
                     </a:solidFill>
                     <a:latin typeface="+mn-ea"/>
                     <a:ea typeface="+mn-ea"/>
                   </a:rPr>
-                  <a:t>execution time [s]</a:t>
+                  <a:t>execution time </a:t>
                 </a:r>
-                <a:endParaRPr lang="ja-JP" altLang="en-US" sz="1600">
+                <a:r>
+                  <a:rPr lang="en-US" altLang="ja-JP" sz="1600" dirty="0" smtClean="0">
+                    <a:solidFill>
+                      <a:sysClr val="windowText" lastClr="000000"/>
+                    </a:solidFill>
+                    <a:latin typeface="+mn-ea"/>
+                    <a:ea typeface="+mn-ea"/>
+                  </a:rPr>
+                  <a:t>[</a:t>
+                </a:r>
+                <a:r>
+                  <a:rPr lang="en-US" altLang="ja-JP" sz="1600" dirty="0" err="1" smtClean="0">
+                    <a:solidFill>
+                      <a:sysClr val="windowText" lastClr="000000"/>
+                    </a:solidFill>
+                    <a:latin typeface="+mn-ea"/>
+                    <a:ea typeface="+mn-ea"/>
+                  </a:rPr>
+                  <a:t>ms</a:t>
+                </a:r>
+                <a:r>
+                  <a:rPr lang="en-US" altLang="ja-JP" sz="1600" dirty="0">
+                    <a:solidFill>
+                      <a:sysClr val="windowText" lastClr="000000"/>
+                    </a:solidFill>
+                    <a:latin typeface="+mn-ea"/>
+                    <a:ea typeface="+mn-ea"/>
+                  </a:rPr>
+                  <a:t>]</a:t>
+                </a:r>
+                <a:endParaRPr lang="ja-JP" altLang="en-US" sz="1600" dirty="0">
                   <a:solidFill>
                     <a:sysClr val="windowText" lastClr="000000"/>
                   </a:solidFill>
@@ -497,7 +527,7 @@
             </a:p>
           </c:txPr>
         </c:title>
-        <c:numFmt formatCode="#,##0.000_ " sourceLinked="0"/>
+        <c:numFmt formatCode="#,##0_ " sourceLinked="0"/>
         <c:majorTickMark val="none"/>
         <c:minorTickMark val="none"/>
         <c:tickLblPos val="nextTo"/>
@@ -600,6 +630,7 @@
   <c:externalData r:id="rId4">
     <c:autoUpdate val="0"/>
   </c:externalData>
+  <c:userShapes r:id="rId5"/>
 </c:chartSpace>
 </file>
 
@@ -693,7 +724,7 @@
               <c:strCache>
                 <c:ptCount val="1"/>
                 <c:pt idx="0">
-                  <c:v>Derivatives</c:v>
+                  <c:v>computeTransform</c:v>
                 </c:pt>
               </c:strCache>
             </c:strRef>
@@ -729,10 +760,10 @@
                 <c:formatCode>#,##0.0000_ </c:formatCode>
                 <c:ptCount val="2"/>
                 <c:pt idx="0">
-                  <c:v>3.4754999999999998</c:v>
+                  <c:v>0.29799999999999999</c:v>
                 </c:pt>
                 <c:pt idx="1">
-                  <c:v>1.8600000000000002E-2</c:v>
+                  <c:v>7.8E-2</c:v>
                 </c:pt>
               </c:numCache>
             </c:numRef>
@@ -790,10 +821,10 @@
                 <c:formatCode>#,##0.0000_ </c:formatCode>
                 <c:ptCount val="2"/>
                 <c:pt idx="0">
-                  <c:v>1</c:v>
+                  <c:v>6.0000000000000053E-3</c:v>
                 </c:pt>
                 <c:pt idx="1">
-                  <c:v>0.44940000000000008</c:v>
+                  <c:v>4.0000000000000036E-3</c:v>
                 </c:pt>
               </c:numCache>
             </c:numRef>
@@ -2090,6 +2121,55 @@
 </cs:chartStyle>
 </file>
 
+<file path=ppt/drawings/drawing1.xml><?xml version="1.0" encoding="utf-8"?>
+<c:userShapes xmlns:c="http://schemas.openxmlformats.org/drawingml/2006/chart">
+  <cdr:relSizeAnchor xmlns:cdr="http://schemas.openxmlformats.org/drawingml/2006/chartDrawing">
+    <cdr:from>
+      <cdr:x>0.32309</cdr:x>
+      <cdr:y>0.53256</cdr:y>
+    </cdr:from>
+    <cdr:to>
+      <cdr:x>0.97485</cdr:x>
+      <cdr:y>0.53256</cdr:y>
+    </cdr:to>
+    <cdr:cxnSp macro="">
+      <cdr:nvCxnSpPr>
+        <cdr:cNvPr id="5" name="直線コネクタ 4"/>
+        <cdr:cNvCxnSpPr/>
+      </cdr:nvCxnSpPr>
+      <cdr:spPr>
+        <a:xfrm xmlns:a="http://schemas.openxmlformats.org/drawingml/2006/main">
+          <a:off x="1525664" y="1408322"/>
+          <a:ext cx="3077650" cy="0"/>
+        </a:xfrm>
+        <a:prstGeom xmlns:a="http://schemas.openxmlformats.org/drawingml/2006/main" prst="line">
+          <a:avLst/>
+        </a:prstGeom>
+        <a:ln xmlns:a="http://schemas.openxmlformats.org/drawingml/2006/main" w="19050">
+          <a:solidFill>
+            <a:srgbClr val="002060"/>
+          </a:solidFill>
+        </a:ln>
+      </cdr:spPr>
+      <cdr:style>
+        <a:lnRef xmlns:a="http://schemas.openxmlformats.org/drawingml/2006/main" idx="1">
+          <a:schemeClr val="accent1"/>
+        </a:lnRef>
+        <a:fillRef xmlns:a="http://schemas.openxmlformats.org/drawingml/2006/main" idx="0">
+          <a:schemeClr val="accent1"/>
+        </a:fillRef>
+        <a:effectRef xmlns:a="http://schemas.openxmlformats.org/drawingml/2006/main" idx="0">
+          <a:schemeClr val="accent1"/>
+        </a:effectRef>
+        <a:fontRef xmlns:a="http://schemas.openxmlformats.org/drawingml/2006/main" idx="minor">
+          <a:schemeClr val="tx1"/>
+        </a:fontRef>
+      </cdr:style>
+    </cdr:cxnSp>
+  </cdr:relSizeAnchor>
+</c:userShapes>
+</file>
+
 <file path=ppt/notesMasters/notesMaster1.xml><?xml version="1.0" encoding="utf-8"?>
 <p:notesMaster xmlns:a="http://schemas.openxmlformats.org/drawingml/2006/main" xmlns:r="http://schemas.openxmlformats.org/officeDocument/2006/relationships" xmlns:p="http://schemas.openxmlformats.org/presentationml/2006/main">
   <p:cSld>
@@ -2172,7 +2252,7 @@
           <a:p>
             <a:fld id="{7F0095D0-A9E1-4B64-AAAF-C179389DF804}" type="datetimeFigureOut">
               <a:rPr kumimoji="1" lang="ja-JP" altLang="en-US" smtClean="0"/>
-              <a:t>2017/6/29</a:t>
+              <a:t>2018/1/28</a:t>
             </a:fld>
             <a:endParaRPr kumimoji="1" lang="ja-JP" altLang="en-US"/>
           </a:p>
@@ -2909,7 +2989,7 @@
           <a:p>
             <a:fld id="{05B1DBB0-D0CE-4499-8A6D-C73AC9430D35}" type="datetimeFigureOut">
               <a:rPr kumimoji="1" lang="ja-JP" altLang="en-US" smtClean="0"/>
-              <a:t>2017/6/29</a:t>
+              <a:t>2018/1/28</a:t>
             </a:fld>
             <a:endParaRPr kumimoji="1" lang="ja-JP" altLang="en-US"/>
           </a:p>
@@ -3111,7 +3191,7 @@
           <a:p>
             <a:fld id="{05B1DBB0-D0CE-4499-8A6D-C73AC9430D35}" type="datetimeFigureOut">
               <a:rPr kumimoji="1" lang="ja-JP" altLang="en-US" smtClean="0"/>
-              <a:t>2017/6/29</a:t>
+              <a:t>2018/1/28</a:t>
             </a:fld>
             <a:endParaRPr kumimoji="1" lang="ja-JP" altLang="en-US"/>
           </a:p>
@@ -3323,7 +3403,7 @@
           <a:p>
             <a:fld id="{05B1DBB0-D0CE-4499-8A6D-C73AC9430D35}" type="datetimeFigureOut">
               <a:rPr kumimoji="1" lang="ja-JP" altLang="en-US" smtClean="0"/>
-              <a:t>2017/6/29</a:t>
+              <a:t>2018/1/28</a:t>
             </a:fld>
             <a:endParaRPr kumimoji="1" lang="ja-JP" altLang="en-US"/>
           </a:p>
@@ -3523,7 +3603,7 @@
           <a:p>
             <a:fld id="{1D8BD707-D9CF-40AE-B4C6-C98DA3205C09}" type="datetimeFigureOut">
               <a:rPr lang="en-US"/>
-              <a:t>6/29/2017</a:t>
+              <a:t>1/28/2018</a:t>
             </a:fld>
             <a:endParaRPr lang="en-US"/>
           </a:p>
@@ -3693,7 +3773,7 @@
           <a:p>
             <a:fld id="{1D8BD707-D9CF-40AE-B4C6-C98DA3205C09}" type="datetimeFigureOut">
               <a:rPr lang="en-US"/>
-              <a:t>6/29/2017</a:t>
+              <a:t>1/28/2018</a:t>
             </a:fld>
             <a:endParaRPr lang="en-US"/>
           </a:p>
@@ -3906,7 +3986,7 @@
           <a:p>
             <a:fld id="{1D8BD707-D9CF-40AE-B4C6-C98DA3205C09}" type="datetimeFigureOut">
               <a:rPr lang="en-US"/>
-              <a:t>6/29/2017</a:t>
+              <a:t>1/28/2018</a:t>
             </a:fld>
             <a:endParaRPr lang="en-US"/>
           </a:p>
@@ -4053,7 +4133,7 @@
           <a:p>
             <a:fld id="{1D8BD707-D9CF-40AE-B4C6-C98DA3205C09}" type="datetimeFigureOut">
               <a:rPr lang="en-US"/>
-              <a:t>6/29/2017</a:t>
+              <a:t>1/28/2018</a:t>
             </a:fld>
             <a:endParaRPr lang="en-US"/>
           </a:p>
@@ -4177,7 +4257,7 @@
           <a:p>
             <a:fld id="{1D8BD707-D9CF-40AE-B4C6-C98DA3205C09}" type="datetimeFigureOut">
               <a:rPr lang="en-US"/>
-              <a:t>6/29/2017</a:t>
+              <a:t>1/28/2018</a:t>
             </a:fld>
             <a:endParaRPr lang="en-US"/>
           </a:p>
@@ -4376,7 +4456,7 @@
           <a:p>
             <a:fld id="{05B1DBB0-D0CE-4499-8A6D-C73AC9430D35}" type="datetimeFigureOut">
               <a:rPr kumimoji="1" lang="ja-JP" altLang="en-US" smtClean="0"/>
-              <a:t>2017/6/29</a:t>
+              <a:t>2018/1/28</a:t>
             </a:fld>
             <a:endParaRPr kumimoji="1" lang="ja-JP" altLang="en-US"/>
           </a:p>
@@ -4622,7 +4702,7 @@
           <a:p>
             <a:fld id="{05B1DBB0-D0CE-4499-8A6D-C73AC9430D35}" type="datetimeFigureOut">
               <a:rPr kumimoji="1" lang="ja-JP" altLang="en-US" smtClean="0"/>
-              <a:t>2017/6/29</a:t>
+              <a:t>2018/1/28</a:t>
             </a:fld>
             <a:endParaRPr kumimoji="1" lang="ja-JP" altLang="en-US"/>
           </a:p>
@@ -4918,7 +4998,7 @@
           <a:p>
             <a:fld id="{05B1DBB0-D0CE-4499-8A6D-C73AC9430D35}" type="datetimeFigureOut">
               <a:rPr kumimoji="1" lang="ja-JP" altLang="en-US" smtClean="0"/>
-              <a:t>2017/6/29</a:t>
+              <a:t>2018/1/28</a:t>
             </a:fld>
             <a:endParaRPr kumimoji="1" lang="ja-JP" altLang="en-US"/>
           </a:p>
@@ -5349,7 +5429,7 @@
           <a:p>
             <a:fld id="{05B1DBB0-D0CE-4499-8A6D-C73AC9430D35}" type="datetimeFigureOut">
               <a:rPr kumimoji="1" lang="ja-JP" altLang="en-US" smtClean="0"/>
-              <a:t>2017/6/29</a:t>
+              <a:t>2018/1/28</a:t>
             </a:fld>
             <a:endParaRPr kumimoji="1" lang="ja-JP" altLang="en-US"/>
           </a:p>
@@ -5467,7 +5547,7 @@
           <a:p>
             <a:fld id="{05B1DBB0-D0CE-4499-8A6D-C73AC9430D35}" type="datetimeFigureOut">
               <a:rPr kumimoji="1" lang="ja-JP" altLang="en-US" smtClean="0"/>
-              <a:t>2017/6/29</a:t>
+              <a:t>2018/1/28</a:t>
             </a:fld>
             <a:endParaRPr kumimoji="1" lang="ja-JP" altLang="en-US"/>
           </a:p>
@@ -5562,7 +5642,7 @@
           <a:p>
             <a:fld id="{05B1DBB0-D0CE-4499-8A6D-C73AC9430D35}" type="datetimeFigureOut">
               <a:rPr kumimoji="1" lang="ja-JP" altLang="en-US" smtClean="0"/>
-              <a:t>2017/6/29</a:t>
+              <a:t>2018/1/28</a:t>
             </a:fld>
             <a:endParaRPr kumimoji="1" lang="ja-JP" altLang="en-US"/>
           </a:p>
@@ -5871,7 +5951,7 @@
           <a:p>
             <a:fld id="{05B1DBB0-D0CE-4499-8A6D-C73AC9430D35}" type="datetimeFigureOut">
               <a:rPr kumimoji="1" lang="ja-JP" altLang="en-US" smtClean="0"/>
-              <a:t>2017/6/29</a:t>
+              <a:t>2018/1/28</a:t>
             </a:fld>
             <a:endParaRPr kumimoji="1" lang="ja-JP" altLang="en-US"/>
           </a:p>
@@ -6124,7 +6204,7 @@
           <a:p>
             <a:fld id="{05B1DBB0-D0CE-4499-8A6D-C73AC9430D35}" type="datetimeFigureOut">
               <a:rPr kumimoji="1" lang="ja-JP" altLang="en-US" smtClean="0"/>
-              <a:t>2017/6/29</a:t>
+              <a:t>2018/1/28</a:t>
             </a:fld>
             <a:endParaRPr kumimoji="1" lang="ja-JP" altLang="en-US"/>
           </a:p>
@@ -6369,7 +6449,7 @@
           <a:p>
             <a:fld id="{05B1DBB0-D0CE-4499-8A6D-C73AC9430D35}" type="datetimeFigureOut">
               <a:rPr kumimoji="1" lang="ja-JP" altLang="en-US" smtClean="0"/>
-              <a:t>2017/6/29</a:t>
+              <a:t>2018/1/28</a:t>
             </a:fld>
             <a:endParaRPr kumimoji="1" lang="ja-JP" altLang="en-US"/>
           </a:p>
@@ -6924,7 +7004,7 @@
           <a:p>
             <a:fld id="{1D8BD707-D9CF-40AE-B4C6-C98DA3205C09}" type="datetimeFigureOut">
               <a:rPr lang="en-US"/>
-              <a:t>6/29/2017</a:t>
+              <a:t>1/28/2018</a:t>
             </a:fld>
             <a:endParaRPr lang="en-US"/>
           </a:p>
@@ -7157,7 +7237,7 @@
           <p:nvPr>
             <p:extLst>
               <p:ext uri="{D42A27DB-BD31-4B8C-83A1-F6EECF244321}">
-                <p14:modId xmlns:p14="http://schemas.microsoft.com/office/powerpoint/2010/main" val="3769944130"/>
+                <p14:modId xmlns:p14="http://schemas.microsoft.com/office/powerpoint/2010/main" val="4063393823"/>
               </p:ext>
             </p:extLst>
           </p:nvPr>
@@ -7172,6 +7252,48 @@
           </a:graphicData>
         </a:graphic>
       </p:graphicFrame>
+      <p:sp>
+        <p:nvSpPr>
+          <p:cNvPr id="2" name="テキスト ボックス 1"/>
+          <p:cNvSpPr txBox="1"/>
+          <p:nvPr/>
+        </p:nvSpPr>
+        <p:spPr>
+          <a:xfrm>
+            <a:off x="4080999" y="1217532"/>
+            <a:ext cx="807661" cy="246221"/>
+          </a:xfrm>
+          <a:prstGeom prst="rect">
+            <a:avLst/>
+          </a:prstGeom>
+          <a:noFill/>
+        </p:spPr>
+        <p:txBody>
+          <a:bodyPr wrap="square" rtlCol="0">
+            <a:spAutoFit/>
+          </a:bodyPr>
+          <a:lstStyle/>
+          <a:p>
+            <a:r>
+              <a:rPr kumimoji="1" lang="en-US" altLang="ja-JP" sz="1000" dirty="0" smtClean="0">
+                <a:solidFill>
+                  <a:srgbClr val="002060"/>
+                </a:solidFill>
+                <a:latin typeface="Yu Gothic UI" panose="020B0500000000000000" pitchFamily="50" charset="-128"/>
+                <a:ea typeface="Yu Gothic UI" panose="020B0500000000000000" pitchFamily="50" charset="-128"/>
+              </a:rPr>
+              <a:t>deadline</a:t>
+            </a:r>
+            <a:endParaRPr kumimoji="1" lang="ja-JP" altLang="en-US" sz="1000" dirty="0">
+              <a:solidFill>
+                <a:srgbClr val="002060"/>
+              </a:solidFill>
+              <a:latin typeface="Yu Gothic UI" panose="020B0500000000000000" pitchFamily="50" charset="-128"/>
+              <a:ea typeface="Yu Gothic UI" panose="020B0500000000000000" pitchFamily="50" charset="-128"/>
+            </a:endParaRPr>
+          </a:p>
+        </p:txBody>
+      </p:sp>
     </p:spTree>
     <p:extLst>
       <p:ext uri="{BB962C8B-B14F-4D97-AF65-F5344CB8AC3E}">
@@ -7218,7 +7340,7 @@
           <p:nvPr>
             <p:extLst>
               <p:ext uri="{D42A27DB-BD31-4B8C-83A1-F6EECF244321}">
-                <p14:modId xmlns:p14="http://schemas.microsoft.com/office/powerpoint/2010/main" val="2509477208"/>
+                <p14:modId xmlns:p14="http://schemas.microsoft.com/office/powerpoint/2010/main" val="1728635775"/>
               </p:ext>
             </p:extLst>
           </p:nvPr>
@@ -7243,11 +7365,11 @@
   <p:clrMapOvr>
     <a:masterClrMapping/>
   </p:clrMapOvr>
-  <mc:AlternateContent xmlns:mc="http://schemas.openxmlformats.org/markup-compatibility/2006">
-    <mc:Choice xmlns:p14="http://schemas.microsoft.com/office/powerpoint/2010/main" Requires="p14">
+  <mc:AlternateContent xmlns:mc="http://schemas.openxmlformats.org/markup-compatibility/2006" xmlns:p14="http://schemas.microsoft.com/office/powerpoint/2010/main">
+    <mc:Choice Requires="p14">
       <p:transition spd="slow" p14:dur="2000"/>
     </mc:Choice>
-    <mc:Fallback>
+    <mc:Fallback xmlns="">
       <p:transition spd="slow"/>
     </mc:Fallback>
   </mc:AlternateContent>

</xml_diff>